<commit_message>
Dépôt des pptx intro technique maquette
</commit_message>
<xml_diff>
--- a/IHearISay/MaquetteIHM.pptx
+++ b/IHearISay/MaquetteIHM.pptx
@@ -104,6 +104,11 @@
       </a:defRPr>
     </a:lvl9pPr>
   </p:defaultTextStyle>
+  <p:extLst>
+    <p:ext uri="{EFAFB233-063F-42B5-8137-9DF3F51BA10A}">
+      <p15:sldGuideLst xmlns:p15="http://schemas.microsoft.com/office/powerpoint/2012/main"/>
+    </p:ext>
+  </p:extLst>
 </p:presentation>
 </file>
 
@@ -238,7 +243,7 @@
           <a:p>
             <a:fld id="{904B2CA0-6EC9-462C-B70B-1CC3CBEF0819}" type="datetimeFigureOut">
               <a:rPr lang="fr-FR" smtClean="0"/>
-              <a:t>04/12/2016</a:t>
+              <a:t>06/12/2016</a:t>
             </a:fld>
             <a:endParaRPr lang="fr-FR"/>
           </a:p>
@@ -408,7 +413,7 @@
           <a:p>
             <a:fld id="{904B2CA0-6EC9-462C-B70B-1CC3CBEF0819}" type="datetimeFigureOut">
               <a:rPr lang="fr-FR" smtClean="0"/>
-              <a:t>04/12/2016</a:t>
+              <a:t>06/12/2016</a:t>
             </a:fld>
             <a:endParaRPr lang="fr-FR"/>
           </a:p>
@@ -588,7 +593,7 @@
           <a:p>
             <a:fld id="{904B2CA0-6EC9-462C-B70B-1CC3CBEF0819}" type="datetimeFigureOut">
               <a:rPr lang="fr-FR" smtClean="0"/>
-              <a:t>04/12/2016</a:t>
+              <a:t>06/12/2016</a:t>
             </a:fld>
             <a:endParaRPr lang="fr-FR"/>
           </a:p>
@@ -758,7 +763,7 @@
           <a:p>
             <a:fld id="{904B2CA0-6EC9-462C-B70B-1CC3CBEF0819}" type="datetimeFigureOut">
               <a:rPr lang="fr-FR" smtClean="0"/>
-              <a:t>04/12/2016</a:t>
+              <a:t>06/12/2016</a:t>
             </a:fld>
             <a:endParaRPr lang="fr-FR"/>
           </a:p>
@@ -1004,7 +1009,7 @@
           <a:p>
             <a:fld id="{904B2CA0-6EC9-462C-B70B-1CC3CBEF0819}" type="datetimeFigureOut">
               <a:rPr lang="fr-FR" smtClean="0"/>
-              <a:t>04/12/2016</a:t>
+              <a:t>06/12/2016</a:t>
             </a:fld>
             <a:endParaRPr lang="fr-FR"/>
           </a:p>
@@ -1236,7 +1241,7 @@
           <a:p>
             <a:fld id="{904B2CA0-6EC9-462C-B70B-1CC3CBEF0819}" type="datetimeFigureOut">
               <a:rPr lang="fr-FR" smtClean="0"/>
-              <a:t>04/12/2016</a:t>
+              <a:t>06/12/2016</a:t>
             </a:fld>
             <a:endParaRPr lang="fr-FR"/>
           </a:p>
@@ -1603,7 +1608,7 @@
           <a:p>
             <a:fld id="{904B2CA0-6EC9-462C-B70B-1CC3CBEF0819}" type="datetimeFigureOut">
               <a:rPr lang="fr-FR" smtClean="0"/>
-              <a:t>04/12/2016</a:t>
+              <a:t>06/12/2016</a:t>
             </a:fld>
             <a:endParaRPr lang="fr-FR"/>
           </a:p>
@@ -1721,7 +1726,7 @@
           <a:p>
             <a:fld id="{904B2CA0-6EC9-462C-B70B-1CC3CBEF0819}" type="datetimeFigureOut">
               <a:rPr lang="fr-FR" smtClean="0"/>
-              <a:t>04/12/2016</a:t>
+              <a:t>06/12/2016</a:t>
             </a:fld>
             <a:endParaRPr lang="fr-FR"/>
           </a:p>
@@ -1816,7 +1821,7 @@
           <a:p>
             <a:fld id="{904B2CA0-6EC9-462C-B70B-1CC3CBEF0819}" type="datetimeFigureOut">
               <a:rPr lang="fr-FR" smtClean="0"/>
-              <a:t>04/12/2016</a:t>
+              <a:t>06/12/2016</a:t>
             </a:fld>
             <a:endParaRPr lang="fr-FR"/>
           </a:p>
@@ -2093,7 +2098,7 @@
           <a:p>
             <a:fld id="{904B2CA0-6EC9-462C-B70B-1CC3CBEF0819}" type="datetimeFigureOut">
               <a:rPr lang="fr-FR" smtClean="0"/>
-              <a:t>04/12/2016</a:t>
+              <a:t>06/12/2016</a:t>
             </a:fld>
             <a:endParaRPr lang="fr-FR"/>
           </a:p>
@@ -2346,7 +2351,7 @@
           <a:p>
             <a:fld id="{904B2CA0-6EC9-462C-B70B-1CC3CBEF0819}" type="datetimeFigureOut">
               <a:rPr lang="fr-FR" smtClean="0"/>
-              <a:t>04/12/2016</a:t>
+              <a:t>06/12/2016</a:t>
             </a:fld>
             <a:endParaRPr lang="fr-FR"/>
           </a:p>
@@ -2559,7 +2564,7 @@
           <a:p>
             <a:fld id="{904B2CA0-6EC9-462C-B70B-1CC3CBEF0819}" type="datetimeFigureOut">
               <a:rPr lang="fr-FR" smtClean="0"/>
-              <a:t>04/12/2016</a:t>
+              <a:t>06/12/2016</a:t>
             </a:fld>
             <a:endParaRPr lang="fr-FR"/>
           </a:p>
@@ -3124,8 +3129,8 @@
         </p:nvSpPr>
         <p:spPr>
           <a:xfrm>
-            <a:off x="999066" y="863599"/>
-            <a:ext cx="6828367" cy="4889500"/>
+            <a:off x="999067" y="863599"/>
+            <a:ext cx="5427370" cy="4889500"/>
           </a:xfrm>
           <a:prstGeom prst="rect">
             <a:avLst/>
@@ -3150,10 +3155,6 @@
           <a:lstStyle/>
           <a:p>
             <a:pPr algn="ctr"/>
-            <a:r>
-              <a:rPr lang="fr-FR" dirty="0" smtClean="0"/>
-              <a:t>Grille</a:t>
-            </a:r>
             <a:endParaRPr lang="fr-FR" dirty="0"/>
           </a:p>
         </p:txBody>
@@ -3166,7 +3167,7 @@
         </p:nvSpPr>
         <p:spPr>
           <a:xfrm>
-            <a:off x="8352367" y="1122363"/>
+            <a:off x="8259232" y="1122363"/>
             <a:ext cx="2523067" cy="548747"/>
           </a:xfrm>
           <a:prstGeom prst="rect">
@@ -3208,7 +3209,7 @@
         </p:nvSpPr>
         <p:spPr>
           <a:xfrm>
-            <a:off x="8352367" y="1806839"/>
+            <a:off x="8259232" y="1806839"/>
             <a:ext cx="2523067" cy="548747"/>
           </a:xfrm>
           <a:prstGeom prst="rect">
@@ -3250,7 +3251,7 @@
         </p:nvSpPr>
         <p:spPr>
           <a:xfrm>
-            <a:off x="8352367" y="2491315"/>
+            <a:off x="8259232" y="2491315"/>
             <a:ext cx="2523067" cy="548747"/>
           </a:xfrm>
           <a:prstGeom prst="rect">
@@ -3329,6 +3330,810 @@
           </a:p>
         </p:txBody>
       </p:sp>
+      <p:sp>
+        <p:nvSpPr>
+          <p:cNvPr id="12" name="Rectangle 11"/>
+          <p:cNvSpPr/>
+          <p:nvPr/>
+        </p:nvSpPr>
+        <p:spPr>
+          <a:xfrm>
+            <a:off x="8248650" y="3211365"/>
+            <a:ext cx="2523067" cy="2370430"/>
+          </a:xfrm>
+          <a:prstGeom prst="rect">
+            <a:avLst/>
+          </a:prstGeom>
+        </p:spPr>
+        <p:style>
+          <a:lnRef idx="0">
+            <a:schemeClr val="accent3"/>
+          </a:lnRef>
+          <a:fillRef idx="3">
+            <a:schemeClr val="accent3"/>
+          </a:fillRef>
+          <a:effectRef idx="3">
+            <a:schemeClr val="accent3"/>
+          </a:effectRef>
+          <a:fontRef idx="minor">
+            <a:schemeClr val="lt1"/>
+          </a:fontRef>
+        </p:style>
+        <p:txBody>
+          <a:bodyPr rtlCol="0" anchor="ctr"/>
+          <a:lstStyle/>
+          <a:p>
+            <a:pPr algn="ctr"/>
+            <a:r>
+              <a:rPr lang="fr-FR" dirty="0" smtClean="0"/>
+              <a:t>Liste des grilles</a:t>
+            </a:r>
+            <a:endParaRPr lang="fr-FR" dirty="0"/>
+          </a:p>
+        </p:txBody>
+      </p:sp>
+      <p:sp>
+        <p:nvSpPr>
+          <p:cNvPr id="16" name="Rectangle 15"/>
+          <p:cNvSpPr/>
+          <p:nvPr/>
+        </p:nvSpPr>
+        <p:spPr>
+          <a:xfrm>
+            <a:off x="1100191" y="939798"/>
+            <a:ext cx="1282919" cy="572808"/>
+          </a:xfrm>
+          <a:prstGeom prst="rect">
+            <a:avLst/>
+          </a:prstGeom>
+          <a:solidFill>
+            <a:schemeClr val="bg1">
+              <a:lumMod val="65000"/>
+            </a:schemeClr>
+          </a:solidFill>
+        </p:spPr>
+        <p:style>
+          <a:lnRef idx="0">
+            <a:schemeClr val="accent3"/>
+          </a:lnRef>
+          <a:fillRef idx="3">
+            <a:schemeClr val="accent3"/>
+          </a:fillRef>
+          <a:effectRef idx="3">
+            <a:schemeClr val="accent3"/>
+          </a:effectRef>
+          <a:fontRef idx="minor">
+            <a:schemeClr val="lt1"/>
+          </a:fontRef>
+        </p:style>
+        <p:txBody>
+          <a:bodyPr rtlCol="0" anchor="ctr"/>
+          <a:lstStyle/>
+          <a:p>
+            <a:pPr algn="ctr"/>
+            <a:r>
+              <a:rPr lang="fr-FR" dirty="0" smtClean="0"/>
+              <a:t>I </a:t>
+            </a:r>
+            <a:r>
+              <a:rPr lang="fr-FR" dirty="0" err="1" smtClean="0"/>
+              <a:t>Hear</a:t>
+            </a:r>
+            <a:endParaRPr lang="fr-FR" dirty="0"/>
+          </a:p>
+        </p:txBody>
+      </p:sp>
+      <p:sp>
+        <p:nvSpPr>
+          <p:cNvPr id="18" name="Rectangle 17"/>
+          <p:cNvSpPr/>
+          <p:nvPr/>
+        </p:nvSpPr>
+        <p:spPr>
+          <a:xfrm>
+            <a:off x="2383110" y="939798"/>
+            <a:ext cx="1246260" cy="572808"/>
+          </a:xfrm>
+          <a:prstGeom prst="rect">
+            <a:avLst/>
+          </a:prstGeom>
+          <a:solidFill>
+            <a:schemeClr val="bg1">
+              <a:lumMod val="65000"/>
+            </a:schemeClr>
+          </a:solidFill>
+        </p:spPr>
+        <p:style>
+          <a:lnRef idx="0">
+            <a:schemeClr val="accent3"/>
+          </a:lnRef>
+          <a:fillRef idx="3">
+            <a:schemeClr val="accent3"/>
+          </a:fillRef>
+          <a:effectRef idx="3">
+            <a:schemeClr val="accent3"/>
+          </a:effectRef>
+          <a:fontRef idx="minor">
+            <a:schemeClr val="lt1"/>
+          </a:fontRef>
+        </p:style>
+        <p:txBody>
+          <a:bodyPr rtlCol="0" anchor="ctr"/>
+          <a:lstStyle/>
+          <a:p>
+            <a:pPr algn="ctr"/>
+            <a:r>
+              <a:rPr lang="fr-FR" dirty="0" smtClean="0"/>
+              <a:t>I Say</a:t>
+            </a:r>
+            <a:endParaRPr lang="fr-FR" dirty="0"/>
+          </a:p>
+        </p:txBody>
+      </p:sp>
+      <p:sp>
+        <p:nvSpPr>
+          <p:cNvPr id="19" name="Rectangle 18"/>
+          <p:cNvSpPr/>
+          <p:nvPr/>
+        </p:nvSpPr>
+        <p:spPr>
+          <a:xfrm>
+            <a:off x="1108894" y="1508404"/>
+            <a:ext cx="1256809" cy="4168494"/>
+          </a:xfrm>
+          <a:prstGeom prst="rect">
+            <a:avLst/>
+          </a:prstGeom>
+          <a:solidFill>
+            <a:schemeClr val="bg1">
+              <a:lumMod val="65000"/>
+            </a:schemeClr>
+          </a:solidFill>
+        </p:spPr>
+        <p:style>
+          <a:lnRef idx="0">
+            <a:schemeClr val="accent3"/>
+          </a:lnRef>
+          <a:fillRef idx="3">
+            <a:schemeClr val="accent3"/>
+          </a:fillRef>
+          <a:effectRef idx="3">
+            <a:schemeClr val="accent3"/>
+          </a:effectRef>
+          <a:fontRef idx="minor">
+            <a:schemeClr val="lt1"/>
+          </a:fontRef>
+        </p:style>
+        <p:txBody>
+          <a:bodyPr rtlCol="0" anchor="ctr"/>
+          <a:lstStyle/>
+          <a:p>
+            <a:pPr algn="ctr"/>
+            <a:endParaRPr lang="fr-FR" dirty="0"/>
+          </a:p>
+        </p:txBody>
+      </p:sp>
+      <p:sp>
+        <p:nvSpPr>
+          <p:cNvPr id="20" name="Rectangle 19"/>
+          <p:cNvSpPr/>
+          <p:nvPr/>
+        </p:nvSpPr>
+        <p:spPr>
+          <a:xfrm>
+            <a:off x="2365703" y="1517791"/>
+            <a:ext cx="1256809" cy="4168494"/>
+          </a:xfrm>
+          <a:prstGeom prst="rect">
+            <a:avLst/>
+          </a:prstGeom>
+          <a:solidFill>
+            <a:schemeClr val="bg1">
+              <a:lumMod val="65000"/>
+            </a:schemeClr>
+          </a:solidFill>
+        </p:spPr>
+        <p:style>
+          <a:lnRef idx="0">
+            <a:schemeClr val="accent3"/>
+          </a:lnRef>
+          <a:fillRef idx="3">
+            <a:schemeClr val="accent3"/>
+          </a:fillRef>
+          <a:effectRef idx="3">
+            <a:schemeClr val="accent3"/>
+          </a:effectRef>
+          <a:fontRef idx="minor">
+            <a:schemeClr val="lt1"/>
+          </a:fontRef>
+        </p:style>
+        <p:txBody>
+          <a:bodyPr rtlCol="0" anchor="ctr"/>
+          <a:lstStyle/>
+          <a:p>
+            <a:pPr algn="ctr"/>
+            <a:endParaRPr lang="fr-FR" dirty="0"/>
+          </a:p>
+        </p:txBody>
+      </p:sp>
+      <p:graphicFrame>
+        <p:nvGraphicFramePr>
+          <p:cNvPr id="24" name="Tableau 23"/>
+          <p:cNvGraphicFramePr>
+            <a:graphicFrameLocks noGrp="1"/>
+          </p:cNvGraphicFramePr>
+          <p:nvPr>
+            <p:extLst>
+              <p:ext uri="{D42A27DB-BD31-4B8C-83A1-F6EECF244321}">
+                <p14:modId xmlns:p14="http://schemas.microsoft.com/office/powerpoint/2010/main" val="910955641"/>
+              </p:ext>
+            </p:extLst>
+          </p:nvPr>
+        </p:nvGraphicFramePr>
+        <p:xfrm>
+          <a:off x="1108894" y="1517791"/>
+          <a:ext cx="2505660" cy="4168494"/>
+        </p:xfrm>
+        <a:graphic>
+          <a:graphicData uri="http://schemas.openxmlformats.org/drawingml/2006/table">
+            <a:tbl>
+              <a:tblPr firstRow="1" bandRow="1">
+                <a:tableStyleId>{5C22544A-7EE6-4342-B048-85BDC9FD1C3A}</a:tableStyleId>
+              </a:tblPr>
+              <a:tblGrid>
+                <a:gridCol w="1252830"/>
+                <a:gridCol w="1252830"/>
+              </a:tblGrid>
+              <a:tr h="694749">
+                <a:tc>
+                  <a:txBody>
+                    <a:bodyPr/>
+                    <a:lstStyle/>
+                    <a:p>
+                      <a:endParaRPr lang="fr-FR" dirty="0">
+                        <a:solidFill>
+                          <a:srgbClr val="FF0000"/>
+                        </a:solidFill>
+                      </a:endParaRPr>
+                    </a:p>
+                  </a:txBody>
+                  <a:tcPr>
+                    <a:solidFill>
+                      <a:schemeClr val="bg1">
+                        <a:lumMod val="85000"/>
+                      </a:schemeClr>
+                    </a:solidFill>
+                  </a:tcPr>
+                </a:tc>
+                <a:tc>
+                  <a:txBody>
+                    <a:bodyPr/>
+                    <a:lstStyle/>
+                    <a:p>
+                      <a:endParaRPr lang="fr-FR" dirty="0"/>
+                    </a:p>
+                  </a:txBody>
+                  <a:tcPr>
+                    <a:solidFill>
+                      <a:schemeClr val="bg1">
+                        <a:lumMod val="85000"/>
+                      </a:schemeClr>
+                    </a:solidFill>
+                  </a:tcPr>
+                </a:tc>
+              </a:tr>
+              <a:tr h="694749">
+                <a:tc>
+                  <a:txBody>
+                    <a:bodyPr/>
+                    <a:lstStyle/>
+                    <a:p>
+                      <a:endParaRPr lang="fr-FR" dirty="0"/>
+                    </a:p>
+                  </a:txBody>
+                  <a:tcPr>
+                    <a:solidFill>
+                      <a:schemeClr val="bg1">
+                        <a:lumMod val="85000"/>
+                      </a:schemeClr>
+                    </a:solidFill>
+                  </a:tcPr>
+                </a:tc>
+                <a:tc>
+                  <a:txBody>
+                    <a:bodyPr/>
+                    <a:lstStyle/>
+                    <a:p>
+                      <a:endParaRPr lang="fr-FR" dirty="0"/>
+                    </a:p>
+                  </a:txBody>
+                  <a:tcPr>
+                    <a:solidFill>
+                      <a:schemeClr val="bg1">
+                        <a:lumMod val="85000"/>
+                      </a:schemeClr>
+                    </a:solidFill>
+                  </a:tcPr>
+                </a:tc>
+              </a:tr>
+              <a:tr h="694749">
+                <a:tc>
+                  <a:txBody>
+                    <a:bodyPr/>
+                    <a:lstStyle/>
+                    <a:p>
+                      <a:endParaRPr lang="fr-FR" dirty="0"/>
+                    </a:p>
+                  </a:txBody>
+                  <a:tcPr>
+                    <a:solidFill>
+                      <a:schemeClr val="bg1">
+                        <a:lumMod val="85000"/>
+                      </a:schemeClr>
+                    </a:solidFill>
+                  </a:tcPr>
+                </a:tc>
+                <a:tc>
+                  <a:txBody>
+                    <a:bodyPr/>
+                    <a:lstStyle/>
+                    <a:p>
+                      <a:endParaRPr lang="fr-FR" dirty="0"/>
+                    </a:p>
+                  </a:txBody>
+                  <a:tcPr>
+                    <a:solidFill>
+                      <a:schemeClr val="bg1">
+                        <a:lumMod val="85000"/>
+                      </a:schemeClr>
+                    </a:solidFill>
+                  </a:tcPr>
+                </a:tc>
+              </a:tr>
+              <a:tr h="694749">
+                <a:tc>
+                  <a:txBody>
+                    <a:bodyPr/>
+                    <a:lstStyle/>
+                    <a:p>
+                      <a:endParaRPr lang="fr-FR" dirty="0"/>
+                    </a:p>
+                  </a:txBody>
+                  <a:tcPr>
+                    <a:solidFill>
+                      <a:schemeClr val="bg1">
+                        <a:lumMod val="85000"/>
+                      </a:schemeClr>
+                    </a:solidFill>
+                  </a:tcPr>
+                </a:tc>
+                <a:tc>
+                  <a:txBody>
+                    <a:bodyPr/>
+                    <a:lstStyle/>
+                    <a:p>
+                      <a:endParaRPr lang="fr-FR" dirty="0"/>
+                    </a:p>
+                  </a:txBody>
+                  <a:tcPr>
+                    <a:solidFill>
+                      <a:schemeClr val="bg1">
+                        <a:lumMod val="85000"/>
+                      </a:schemeClr>
+                    </a:solidFill>
+                  </a:tcPr>
+                </a:tc>
+              </a:tr>
+              <a:tr h="694749">
+                <a:tc>
+                  <a:txBody>
+                    <a:bodyPr/>
+                    <a:lstStyle/>
+                    <a:p>
+                      <a:endParaRPr lang="fr-FR" dirty="0"/>
+                    </a:p>
+                  </a:txBody>
+                  <a:tcPr>
+                    <a:solidFill>
+                      <a:schemeClr val="bg1">
+                        <a:lumMod val="85000"/>
+                      </a:schemeClr>
+                    </a:solidFill>
+                  </a:tcPr>
+                </a:tc>
+                <a:tc>
+                  <a:txBody>
+                    <a:bodyPr/>
+                    <a:lstStyle/>
+                    <a:p>
+                      <a:endParaRPr lang="fr-FR" dirty="0"/>
+                    </a:p>
+                  </a:txBody>
+                  <a:tcPr>
+                    <a:solidFill>
+                      <a:schemeClr val="bg1">
+                        <a:lumMod val="85000"/>
+                      </a:schemeClr>
+                    </a:solidFill>
+                  </a:tcPr>
+                </a:tc>
+              </a:tr>
+              <a:tr h="694749">
+                <a:tc>
+                  <a:txBody>
+                    <a:bodyPr/>
+                    <a:lstStyle/>
+                    <a:p>
+                      <a:endParaRPr lang="fr-FR" dirty="0"/>
+                    </a:p>
+                  </a:txBody>
+                  <a:tcPr>
+                    <a:solidFill>
+                      <a:schemeClr val="bg1">
+                        <a:lumMod val="85000"/>
+                      </a:schemeClr>
+                    </a:solidFill>
+                  </a:tcPr>
+                </a:tc>
+                <a:tc>
+                  <a:txBody>
+                    <a:bodyPr/>
+                    <a:lstStyle/>
+                    <a:p>
+                      <a:endParaRPr lang="fr-FR" dirty="0"/>
+                    </a:p>
+                  </a:txBody>
+                  <a:tcPr>
+                    <a:solidFill>
+                      <a:schemeClr val="bg1">
+                        <a:lumMod val="85000"/>
+                      </a:schemeClr>
+                    </a:solidFill>
+                  </a:tcPr>
+                </a:tc>
+              </a:tr>
+            </a:tbl>
+          </a:graphicData>
+        </a:graphic>
+      </p:graphicFrame>
+      <p:sp>
+        <p:nvSpPr>
+          <p:cNvPr id="25" name="Rectangle 24"/>
+          <p:cNvSpPr/>
+          <p:nvPr/>
+        </p:nvSpPr>
+        <p:spPr>
+          <a:xfrm>
+            <a:off x="3749747" y="939798"/>
+            <a:ext cx="1282919" cy="572808"/>
+          </a:xfrm>
+          <a:prstGeom prst="rect">
+            <a:avLst/>
+          </a:prstGeom>
+          <a:solidFill>
+            <a:schemeClr val="bg1">
+              <a:lumMod val="65000"/>
+            </a:schemeClr>
+          </a:solidFill>
+        </p:spPr>
+        <p:style>
+          <a:lnRef idx="0">
+            <a:schemeClr val="accent3"/>
+          </a:lnRef>
+          <a:fillRef idx="3">
+            <a:schemeClr val="accent3"/>
+          </a:fillRef>
+          <a:effectRef idx="3">
+            <a:schemeClr val="accent3"/>
+          </a:effectRef>
+          <a:fontRef idx="minor">
+            <a:schemeClr val="lt1"/>
+          </a:fontRef>
+        </p:style>
+        <p:txBody>
+          <a:bodyPr rtlCol="0" anchor="ctr"/>
+          <a:lstStyle/>
+          <a:p>
+            <a:pPr algn="ctr"/>
+            <a:r>
+              <a:rPr lang="fr-FR" dirty="0" smtClean="0"/>
+              <a:t>I </a:t>
+            </a:r>
+            <a:r>
+              <a:rPr lang="fr-FR" dirty="0" err="1" smtClean="0"/>
+              <a:t>Hear</a:t>
+            </a:r>
+            <a:endParaRPr lang="fr-FR" dirty="0"/>
+          </a:p>
+        </p:txBody>
+      </p:sp>
+      <p:sp>
+        <p:nvSpPr>
+          <p:cNvPr id="26" name="Rectangle 25"/>
+          <p:cNvSpPr/>
+          <p:nvPr/>
+        </p:nvSpPr>
+        <p:spPr>
+          <a:xfrm>
+            <a:off x="5032666" y="939798"/>
+            <a:ext cx="1246260" cy="572808"/>
+          </a:xfrm>
+          <a:prstGeom prst="rect">
+            <a:avLst/>
+          </a:prstGeom>
+          <a:solidFill>
+            <a:schemeClr val="bg1">
+              <a:lumMod val="65000"/>
+            </a:schemeClr>
+          </a:solidFill>
+        </p:spPr>
+        <p:style>
+          <a:lnRef idx="0">
+            <a:schemeClr val="accent3"/>
+          </a:lnRef>
+          <a:fillRef idx="3">
+            <a:schemeClr val="accent3"/>
+          </a:fillRef>
+          <a:effectRef idx="3">
+            <a:schemeClr val="accent3"/>
+          </a:effectRef>
+          <a:fontRef idx="minor">
+            <a:schemeClr val="lt1"/>
+          </a:fontRef>
+        </p:style>
+        <p:txBody>
+          <a:bodyPr rtlCol="0" anchor="ctr"/>
+          <a:lstStyle/>
+          <a:p>
+            <a:pPr algn="ctr"/>
+            <a:r>
+              <a:rPr lang="fr-FR" dirty="0" smtClean="0"/>
+              <a:t>I Say</a:t>
+            </a:r>
+            <a:endParaRPr lang="fr-FR" dirty="0"/>
+          </a:p>
+        </p:txBody>
+      </p:sp>
+      <p:graphicFrame>
+        <p:nvGraphicFramePr>
+          <p:cNvPr id="27" name="Tableau 26"/>
+          <p:cNvGraphicFramePr>
+            <a:graphicFrameLocks noGrp="1"/>
+          </p:cNvGraphicFramePr>
+          <p:nvPr>
+            <p:extLst>
+              <p:ext uri="{D42A27DB-BD31-4B8C-83A1-F6EECF244321}">
+                <p14:modId xmlns:p14="http://schemas.microsoft.com/office/powerpoint/2010/main" val="4058895778"/>
+              </p:ext>
+            </p:extLst>
+          </p:nvPr>
+        </p:nvGraphicFramePr>
+        <p:xfrm>
+          <a:off x="3758450" y="1517791"/>
+          <a:ext cx="2505660" cy="4168494"/>
+        </p:xfrm>
+        <a:graphic>
+          <a:graphicData uri="http://schemas.openxmlformats.org/drawingml/2006/table">
+            <a:tbl>
+              <a:tblPr firstRow="1" bandRow="1">
+                <a:tableStyleId>{5C22544A-7EE6-4342-B048-85BDC9FD1C3A}</a:tableStyleId>
+              </a:tblPr>
+              <a:tblGrid>
+                <a:gridCol w="1252830"/>
+                <a:gridCol w="1252830"/>
+              </a:tblGrid>
+              <a:tr h="694749">
+                <a:tc>
+                  <a:txBody>
+                    <a:bodyPr/>
+                    <a:lstStyle/>
+                    <a:p>
+                      <a:endParaRPr lang="fr-FR" dirty="0">
+                        <a:solidFill>
+                          <a:srgbClr val="FF0000"/>
+                        </a:solidFill>
+                      </a:endParaRPr>
+                    </a:p>
+                  </a:txBody>
+                  <a:tcPr>
+                    <a:solidFill>
+                      <a:schemeClr val="bg1">
+                        <a:lumMod val="85000"/>
+                      </a:schemeClr>
+                    </a:solidFill>
+                  </a:tcPr>
+                </a:tc>
+                <a:tc>
+                  <a:txBody>
+                    <a:bodyPr/>
+                    <a:lstStyle/>
+                    <a:p>
+                      <a:endParaRPr lang="fr-FR" dirty="0"/>
+                    </a:p>
+                  </a:txBody>
+                  <a:tcPr>
+                    <a:solidFill>
+                      <a:schemeClr val="bg1">
+                        <a:lumMod val="85000"/>
+                      </a:schemeClr>
+                    </a:solidFill>
+                  </a:tcPr>
+                </a:tc>
+              </a:tr>
+              <a:tr h="694749">
+                <a:tc>
+                  <a:txBody>
+                    <a:bodyPr/>
+                    <a:lstStyle/>
+                    <a:p>
+                      <a:endParaRPr lang="fr-FR" dirty="0"/>
+                    </a:p>
+                  </a:txBody>
+                  <a:tcPr>
+                    <a:solidFill>
+                      <a:schemeClr val="bg1">
+                        <a:lumMod val="85000"/>
+                      </a:schemeClr>
+                    </a:solidFill>
+                  </a:tcPr>
+                </a:tc>
+                <a:tc>
+                  <a:txBody>
+                    <a:bodyPr/>
+                    <a:lstStyle/>
+                    <a:p>
+                      <a:endParaRPr lang="fr-FR" dirty="0"/>
+                    </a:p>
+                  </a:txBody>
+                  <a:tcPr>
+                    <a:solidFill>
+                      <a:schemeClr val="bg1">
+                        <a:lumMod val="85000"/>
+                      </a:schemeClr>
+                    </a:solidFill>
+                  </a:tcPr>
+                </a:tc>
+              </a:tr>
+              <a:tr h="694749">
+                <a:tc>
+                  <a:txBody>
+                    <a:bodyPr/>
+                    <a:lstStyle/>
+                    <a:p>
+                      <a:endParaRPr lang="fr-FR" dirty="0"/>
+                    </a:p>
+                  </a:txBody>
+                  <a:tcPr>
+                    <a:solidFill>
+                      <a:schemeClr val="bg1">
+                        <a:lumMod val="85000"/>
+                      </a:schemeClr>
+                    </a:solidFill>
+                  </a:tcPr>
+                </a:tc>
+                <a:tc>
+                  <a:txBody>
+                    <a:bodyPr/>
+                    <a:lstStyle/>
+                    <a:p>
+                      <a:endParaRPr lang="fr-FR" dirty="0"/>
+                    </a:p>
+                  </a:txBody>
+                  <a:tcPr>
+                    <a:solidFill>
+                      <a:schemeClr val="bg1">
+                        <a:lumMod val="85000"/>
+                      </a:schemeClr>
+                    </a:solidFill>
+                  </a:tcPr>
+                </a:tc>
+              </a:tr>
+              <a:tr h="694749">
+                <a:tc>
+                  <a:txBody>
+                    <a:bodyPr/>
+                    <a:lstStyle/>
+                    <a:p>
+                      <a:endParaRPr lang="fr-FR" dirty="0"/>
+                    </a:p>
+                  </a:txBody>
+                  <a:tcPr>
+                    <a:solidFill>
+                      <a:schemeClr val="bg1">
+                        <a:lumMod val="85000"/>
+                      </a:schemeClr>
+                    </a:solidFill>
+                  </a:tcPr>
+                </a:tc>
+                <a:tc>
+                  <a:txBody>
+                    <a:bodyPr/>
+                    <a:lstStyle/>
+                    <a:p>
+                      <a:endParaRPr lang="fr-FR" dirty="0"/>
+                    </a:p>
+                  </a:txBody>
+                  <a:tcPr>
+                    <a:solidFill>
+                      <a:schemeClr val="bg1">
+                        <a:lumMod val="85000"/>
+                      </a:schemeClr>
+                    </a:solidFill>
+                  </a:tcPr>
+                </a:tc>
+              </a:tr>
+              <a:tr h="694749">
+                <a:tc>
+                  <a:txBody>
+                    <a:bodyPr/>
+                    <a:lstStyle/>
+                    <a:p>
+                      <a:endParaRPr lang="fr-FR" dirty="0"/>
+                    </a:p>
+                  </a:txBody>
+                  <a:tcPr>
+                    <a:solidFill>
+                      <a:schemeClr val="bg1">
+                        <a:lumMod val="85000"/>
+                      </a:schemeClr>
+                    </a:solidFill>
+                  </a:tcPr>
+                </a:tc>
+                <a:tc>
+                  <a:txBody>
+                    <a:bodyPr/>
+                    <a:lstStyle/>
+                    <a:p>
+                      <a:endParaRPr lang="fr-FR" dirty="0"/>
+                    </a:p>
+                  </a:txBody>
+                  <a:tcPr>
+                    <a:solidFill>
+                      <a:schemeClr val="bg1">
+                        <a:lumMod val="85000"/>
+                      </a:schemeClr>
+                    </a:solidFill>
+                  </a:tcPr>
+                </a:tc>
+              </a:tr>
+              <a:tr h="694749">
+                <a:tc>
+                  <a:txBody>
+                    <a:bodyPr/>
+                    <a:lstStyle/>
+                    <a:p>
+                      <a:endParaRPr lang="fr-FR" dirty="0"/>
+                    </a:p>
+                  </a:txBody>
+                  <a:tcPr>
+                    <a:solidFill>
+                      <a:schemeClr val="bg1">
+                        <a:lumMod val="85000"/>
+                      </a:schemeClr>
+                    </a:solidFill>
+                  </a:tcPr>
+                </a:tc>
+                <a:tc>
+                  <a:txBody>
+                    <a:bodyPr/>
+                    <a:lstStyle/>
+                    <a:p>
+                      <a:endParaRPr lang="fr-FR" dirty="0"/>
+                    </a:p>
+                  </a:txBody>
+                  <a:tcPr>
+                    <a:solidFill>
+                      <a:schemeClr val="bg1">
+                        <a:lumMod val="85000"/>
+                      </a:schemeClr>
+                    </a:solidFill>
+                  </a:tcPr>
+                </a:tc>
+              </a:tr>
+            </a:tbl>
+          </a:graphicData>
+        </a:graphic>
+      </p:graphicFrame>
     </p:spTree>
     <p:extLst>
       <p:ext uri="{BB962C8B-B14F-4D97-AF65-F5344CB8AC3E}">

</xml_diff>